<commit_message>
slides for module 2 (draft)
</commit_message>
<xml_diff>
--- a/module-2/ppt/2.4-Supervised Learning.pptx
+++ b/module-2/ppt/2.4-Supervised Learning.pptx
@@ -116,6 +116,11 @@
       </a:defRPr>
     </a:lvl9pPr>
   </p:defaultTextStyle>
+  <p:extLst>
+    <p:ext uri="{EFAFB233-063F-42B5-8137-9DF3F51BA10A}">
+      <p15:sldGuideLst xmlns:p15="http://schemas.microsoft.com/office/powerpoint/2012/main"/>
+    </p:ext>
+  </p:extLst>
 </p:presentation>
 </file>
 
@@ -4754,8 +4759,32 @@
                 <a:latin typeface="Arial" panose="020B0604020202020204" pitchFamily="34" charset="0"/>
                 <a:cs typeface="Arial" panose="020B0604020202020204" pitchFamily="34" charset="0"/>
               </a:rPr>
-              <a:t>Supervised Learning</a:t>
-            </a:r>
+              <a:t>Supervised </a:t>
+            </a:r>
+            <a:r>
+              <a:rPr lang="en-US" sz="3600">
+                <a:latin typeface="Arial" panose="020B0604020202020204" pitchFamily="34" charset="0"/>
+                <a:cs typeface="Arial" panose="020B0604020202020204" pitchFamily="34" charset="0"/>
+              </a:rPr>
+              <a:t>Learning </a:t>
+            </a:r>
+            <a:br>
+              <a:rPr lang="en-US" sz="3600">
+                <a:latin typeface="Arial" panose="020B0604020202020204" pitchFamily="34" charset="0"/>
+                <a:cs typeface="Arial" panose="020B0604020202020204" pitchFamily="34" charset="0"/>
+              </a:rPr>
+            </a:br>
+            <a:r>
+              <a:rPr lang="en-US" sz="3600">
+                <a:latin typeface="Arial" panose="020B0604020202020204" pitchFamily="34" charset="0"/>
+                <a:cs typeface="Arial" panose="020B0604020202020204" pitchFamily="34" charset="0"/>
+              </a:rPr>
+              <a:t>on Network Traffic</a:t>
+            </a:r>
+            <a:endParaRPr lang="en-US" sz="3600" dirty="0">
+              <a:latin typeface="Arial" panose="020B0604020202020204" pitchFamily="34" charset="0"/>
+              <a:cs typeface="Arial" panose="020B0604020202020204" pitchFamily="34" charset="0"/>
+            </a:endParaRPr>
           </a:p>
           <a:p>
             <a:pPr algn="l"/>
@@ -5125,7 +5154,11 @@
           <a:lstStyle/>
           <a:p>
             <a:r>
-              <a:rPr lang="en-US" dirty="0"/>
+              <a:rPr lang="en-US" b="1" dirty="0">
+                <a:solidFill>
+                  <a:schemeClr val="accent1"/>
+                </a:solidFill>
+              </a:rPr>
               <a:t>Linear Models</a:t>
             </a:r>
           </a:p>

</xml_diff>